<commit_message>
2021.07.29 과제(mysite - guestbook)
</commit_message>
<xml_diff>
--- a/시퀀스 다이어그램_board.pptx
+++ b/시퀀스 다이어그램_board.pptx
@@ -3543,11 +3543,7 @@
           <a:p>
             <a:r>
               <a:rPr lang="en-US" altLang="ko-KR" sz="1000" b="1" smtClean="0"/>
-              <a:t>/</a:t>
-            </a:r>
-            <a:r>
-              <a:rPr lang="en-US" altLang="ko-KR" sz="1000" b="1" smtClean="0"/>
-              <a:t>list</a:t>
+              <a:t>/list</a:t>
             </a:r>
           </a:p>
           <a:p>
@@ -4067,11 +4063,7 @@
           <a:p>
             <a:r>
               <a:rPr lang="en-US" altLang="ko-KR" sz="1050" b="1"/>
-              <a:t>id = "boardList</a:t>
-            </a:r>
-            <a:r>
-              <a:rPr lang="en-US" altLang="ko-KR" sz="1050" b="1"/>
-              <a:t>" </a:t>
+              <a:t>id = "boardList" </a:t>
             </a:r>
             <a:endParaRPr lang="en-US" altLang="ko-KR" sz="1050" b="1" smtClean="0"/>
           </a:p>
@@ -4082,11 +4074,7 @@
             </a:r>
             <a:r>
               <a:rPr lang="en-US" altLang="ko-KR" sz="1050" b="1"/>
-              <a:t>= "String</a:t>
-            </a:r>
-            <a:r>
-              <a:rPr lang="en-US" altLang="ko-KR" sz="1050" b="1"/>
-              <a:t>" </a:t>
+              <a:t>= "String" </a:t>
             </a:r>
             <a:endParaRPr lang="en-US" altLang="ko-KR" sz="1050" b="1" smtClean="0"/>
           </a:p>
@@ -4377,11 +4365,6 @@
               </a:rPr>
               <a:t>기</a:t>
             </a:r>
-            <a:endParaRPr lang="ko-KR" altLang="en-US" sz="1400">
-              <a:solidFill>
-                <a:schemeClr val="tx1"/>
-              </a:solidFill>
-            </a:endParaRPr>
           </a:p>
         </p:txBody>
       </p:sp>
@@ -4644,7 +4627,6 @@
               <a:rPr lang="en-US" altLang="ko-KR" sz="1200" b="1" smtClean="0"/>
               <a:t>updateHit()</a:t>
             </a:r>
-            <a:endParaRPr lang="en-US" altLang="ko-KR" sz="1200" b="1" smtClean="0"/>
           </a:p>
         </p:txBody>
       </p:sp>
@@ -4783,11 +4765,7 @@
           <a:p>
             <a:r>
               <a:rPr lang="en-US" altLang="ko-KR" sz="1200"/>
-              <a:t>id="updateHit</a:t>
-            </a:r>
-            <a:r>
-              <a:rPr lang="en-US" altLang="ko-KR" sz="1200"/>
-              <a:t>" </a:t>
+              <a:t>id="updateHit" </a:t>
             </a:r>
             <a:endParaRPr lang="en-US" altLang="ko-KR" sz="1200" smtClean="0"/>
           </a:p>
@@ -5239,7 +5217,6 @@
               <a:rPr lang="en-US" altLang="ko-KR" sz="1200" b="1" smtClean="0"/>
               <a:t>selectBoard()</a:t>
             </a:r>
-            <a:endParaRPr lang="en-US" altLang="ko-KR" sz="1200" b="1" smtClean="0"/>
           </a:p>
         </p:txBody>
       </p:sp>
@@ -5453,11 +5430,7 @@
             </a:r>
             <a:r>
               <a:rPr lang="en-US" altLang="ko-KR" sz="1050" i="1"/>
-              <a:t>"selectBoard</a:t>
-            </a:r>
-            <a:r>
-              <a:rPr lang="en-US" altLang="ko-KR" sz="1050" i="1"/>
-              <a:t>" </a:t>
+              <a:t>"selectBoard" </a:t>
             </a:r>
             <a:endParaRPr lang="en-US" altLang="ko-KR" sz="1050" i="1" smtClean="0"/>
           </a:p>
@@ -5468,11 +5441,7 @@
             </a:r>
             <a:r>
               <a:rPr lang="en-US" altLang="ko-KR" sz="1050" i="1"/>
-              <a:t>="int</a:t>
-            </a:r>
-            <a:r>
-              <a:rPr lang="en-US" altLang="ko-KR" sz="1050" i="1"/>
-              <a:t>" </a:t>
+              <a:t>="int" </a:t>
             </a:r>
             <a:endParaRPr lang="en-US" altLang="ko-KR" sz="1050" i="1" smtClean="0"/>
           </a:p>
@@ -5547,11 +5516,6 @@
               </a:rPr>
               <a:t>폼</a:t>
             </a:r>
-            <a:endParaRPr lang="ko-KR" altLang="en-US" sz="1100">
-              <a:solidFill>
-                <a:schemeClr val="tx1"/>
-              </a:solidFill>
-            </a:endParaRPr>
           </a:p>
         </p:txBody>
       </p:sp>
@@ -5951,7 +5915,6 @@
               <a:rPr lang="en-US" altLang="ko-KR" sz="1200" b="1" smtClean="0"/>
               <a:t>write()</a:t>
             </a:r>
-            <a:endParaRPr lang="en-US" altLang="ko-KR" sz="1200" b="1" smtClean="0"/>
           </a:p>
         </p:txBody>
       </p:sp>
@@ -6081,7 +6044,6 @@
               <a:rPr lang="en-US" altLang="ko-KR" sz="1200" b="1" smtClean="0"/>
               <a:t>insert()</a:t>
             </a:r>
-            <a:endParaRPr lang="en-US" altLang="ko-KR" sz="1200" b="1" smtClean="0"/>
           </a:p>
         </p:txBody>
       </p:sp>
@@ -6443,11 +6405,7 @@
           <a:p>
             <a:r>
               <a:rPr lang="en-US" altLang="ko-KR" sz="1000"/>
-              <a:t>id="boardInsert</a:t>
-            </a:r>
-            <a:r>
-              <a:rPr lang="en-US" altLang="ko-KR" sz="1000"/>
-              <a:t>" </a:t>
+              <a:t>id="boardInsert" </a:t>
             </a:r>
             <a:endParaRPr lang="en-US" altLang="ko-KR" sz="1000" smtClean="0"/>
           </a:p>
@@ -6530,11 +6488,6 @@
               </a:rPr>
               <a:t>제</a:t>
             </a:r>
-            <a:endParaRPr lang="ko-KR" altLang="en-US" sz="1100">
-              <a:solidFill>
-                <a:schemeClr val="tx1"/>
-              </a:solidFill>
-            </a:endParaRPr>
           </a:p>
         </p:txBody>
       </p:sp>
@@ -6628,11 +6581,7 @@
           <a:p>
             <a:r>
               <a:rPr lang="en-US" altLang="ko-KR" sz="1000" b="1" smtClean="0"/>
-              <a:t>/</a:t>
-            </a:r>
-            <a:r>
-              <a:rPr lang="en-US" altLang="ko-KR" sz="1000" b="1" smtClean="0"/>
-              <a:t>delete</a:t>
+              <a:t>/delete</a:t>
             </a:r>
           </a:p>
           <a:p>
@@ -6812,7 +6761,6 @@
               <a:rPr lang="en-US" altLang="ko-KR" sz="1200" b="1" smtClean="0"/>
               <a:t>delete()</a:t>
             </a:r>
-            <a:endParaRPr lang="en-US" altLang="ko-KR" sz="1200" b="1" smtClean="0"/>
           </a:p>
         </p:txBody>
       </p:sp>
@@ -6842,7 +6790,6 @@
               <a:rPr lang="en-US" altLang="ko-KR" sz="1200" b="1" smtClean="0"/>
               <a:t>delete()</a:t>
             </a:r>
-            <a:endParaRPr lang="en-US" altLang="ko-KR" sz="1200" b="1" smtClean="0"/>
           </a:p>
         </p:txBody>
       </p:sp>
@@ -7136,11 +7083,7 @@
             </a:r>
             <a:r>
               <a:rPr lang="en-US" altLang="ko-KR" sz="1050" i="1"/>
-              <a:t>"boardDelete</a:t>
-            </a:r>
-            <a:r>
-              <a:rPr lang="en-US" altLang="ko-KR" sz="1050" i="1"/>
-              <a:t>" </a:t>
+              <a:t>"boardDelete" </a:t>
             </a:r>
             <a:endParaRPr lang="en-US" altLang="ko-KR" sz="1050" i="1" smtClean="0"/>
           </a:p>
@@ -7259,7 +7202,6 @@
               <a:rPr lang="ko-KR" altLang="en-US" sz="1000" b="1"/>
               <a:t>수</a:t>
             </a:r>
-            <a:endParaRPr lang="ko-KR" altLang="en-US" sz="1000" b="1"/>
           </a:p>
         </p:txBody>
       </p:sp>
@@ -7293,7 +7235,6 @@
               <a:rPr lang="ko-KR" altLang="en-US" sz="1000" b="1"/>
               <a:t>수</a:t>
             </a:r>
-            <a:endParaRPr lang="ko-KR" altLang="en-US" sz="1000" b="1"/>
           </a:p>
         </p:txBody>
       </p:sp>
@@ -7326,6 +7267,39 @@
             <a:r>
               <a:rPr lang="ko-KR" altLang="en-US" sz="1000" b="1"/>
               <a:t>수</a:t>
+            </a:r>
+          </a:p>
+        </p:txBody>
+      </p:sp>
+      <p:sp>
+        <p:nvSpPr>
+          <p:cNvPr id="118" name="TextBox 117"/>
+          <p:cNvSpPr txBox="1"/>
+          <p:nvPr/>
+        </p:nvSpPr>
+        <p:spPr>
+          <a:xfrm>
+            <a:off x="596081" y="568938"/>
+            <a:ext cx="1236950" cy="246221"/>
+          </a:xfrm>
+          <a:prstGeom prst="rect">
+            <a:avLst/>
+          </a:prstGeom>
+          <a:noFill/>
+        </p:spPr>
+        <p:txBody>
+          <a:bodyPr wrap="square" rtlCol="0">
+            <a:spAutoFit/>
+          </a:bodyPr>
+          <a:lstStyle/>
+          <a:p>
+            <a:r>
+              <a:rPr lang="en-US" altLang="ko-KR" sz="1000" b="1" smtClean="0"/>
+              <a:t>/</a:t>
+            </a:r>
+            <a:r>
+              <a:rPr lang="en-US" altLang="ko-KR" sz="1000" b="1" smtClean="0"/>
+              <a:t>board/list</a:t>
             </a:r>
             <a:endParaRPr lang="ko-KR" altLang="en-US" sz="1000" b="1"/>
           </a:p>
@@ -7812,11 +7786,7 @@
           <a:p>
             <a:r>
               <a:rPr lang="en-US" altLang="ko-KR" sz="1000" b="1" smtClean="0"/>
-              <a:t>/</a:t>
-            </a:r>
-            <a:r>
-              <a:rPr lang="en-US" altLang="ko-KR" sz="1000" b="1" smtClean="0"/>
-              <a:t>modifyFormmodifyForm()</a:t>
+              <a:t>/modifyFormmodifyForm()</a:t>
             </a:r>
             <a:endParaRPr lang="ko-KR" altLang="en-US" sz="1000" b="1"/>
           </a:p>
@@ -8227,7 +8197,6 @@
               <a:rPr lang="en-US" altLang="ko-KR" sz="1000" smtClean="0"/>
               <a:t>modifyForm</a:t>
             </a:r>
-            <a:endParaRPr lang="en-US" altLang="ko-KR" sz="1000" smtClean="0"/>
           </a:p>
         </p:txBody>
       </p:sp>
@@ -8582,11 +8551,6 @@
               </a:rPr>
               <a:t>정</a:t>
             </a:r>
-            <a:endParaRPr lang="ko-KR" altLang="en-US" sz="1400">
-              <a:solidFill>
-                <a:schemeClr val="tx1"/>
-              </a:solidFill>
-            </a:endParaRPr>
           </a:p>
         </p:txBody>
       </p:sp>
@@ -8650,11 +8614,7 @@
           <a:p>
             <a:r>
               <a:rPr lang="en-US" altLang="ko-KR" sz="1000" b="1" smtClean="0"/>
-              <a:t>/</a:t>
-            </a:r>
-            <a:r>
-              <a:rPr lang="en-US" altLang="ko-KR" sz="1000" b="1" smtClean="0"/>
-              <a:t>modify</a:t>
+              <a:t>/modify</a:t>
             </a:r>
           </a:p>
           <a:p>
@@ -8801,7 +8761,6 @@
               <a:rPr lang="en-US" altLang="ko-KR" sz="1200" b="1" smtClean="0"/>
               <a:t>()</a:t>
             </a:r>
-            <a:endParaRPr lang="en-US" altLang="ko-KR" sz="1200" b="1" smtClean="0"/>
           </a:p>
         </p:txBody>
       </p:sp>
@@ -8940,11 +8899,7 @@
           <a:p>
             <a:r>
               <a:rPr lang="en-US" altLang="ko-KR" sz="1200" b="1"/>
-              <a:t>id="Update</a:t>
-            </a:r>
-            <a:r>
-              <a:rPr lang="en-US" altLang="ko-KR" sz="1200" b="1"/>
-              <a:t>" </a:t>
+              <a:t>id="Update" </a:t>
             </a:r>
             <a:endParaRPr lang="en-US" altLang="ko-KR" sz="1200" b="1" smtClean="0"/>
           </a:p>
@@ -9255,7 +9210,6 @@
               <a:rPr lang="ko-KR" altLang="en-US" sz="1000" b="1"/>
               <a:t>수</a:t>
             </a:r>
-            <a:endParaRPr lang="ko-KR" altLang="en-US" sz="1000" b="1"/>
           </a:p>
         </p:txBody>
       </p:sp>
@@ -9289,7 +9243,6 @@
               <a:rPr lang="ko-KR" altLang="en-US" sz="1000" b="1"/>
               <a:t>수</a:t>
             </a:r>
-            <a:endParaRPr lang="ko-KR" altLang="en-US" sz="1000" b="1"/>
           </a:p>
         </p:txBody>
       </p:sp>
@@ -9323,7 +9276,6 @@
               <a:rPr lang="ko-KR" altLang="en-US" sz="1000" b="1"/>
               <a:t>수</a:t>
             </a:r>
-            <a:endParaRPr lang="ko-KR" altLang="en-US" sz="1000" b="1"/>
           </a:p>
         </p:txBody>
       </p:sp>
@@ -9357,7 +9309,6 @@
               <a:rPr lang="ko-KR" altLang="en-US" sz="1000" b="1"/>
               <a:t>수</a:t>
             </a:r>
-            <a:endParaRPr lang="ko-KR" altLang="en-US" sz="1000" b="1"/>
           </a:p>
         </p:txBody>
       </p:sp>

</xml_diff>